<commit_message>
Refs #3391. Minor change to text.
</commit_message>
<xml_diff>
--- a/Performance/RebinningStatistics.pptx
+++ b/Performance/RebinningStatistics.pptx
@@ -3175,29 +3175,13 @@
           <a:p>
             <a:r>
               <a:rPr lang="en-GB" dirty="0" smtClean="0"/>
-              <a:t>~</a:t>
-            </a:r>
+              <a:t>~700 MB on Disk</a:t>
+            </a:r>
+          </a:p>
+          <a:p>
             <a:r>
               <a:rPr lang="en-GB" dirty="0" smtClean="0"/>
-              <a:t>700 </a:t>
-            </a:r>
-            <a:r>
-              <a:rPr lang="en-GB" dirty="0" smtClean="0"/>
-              <a:t>MB </a:t>
-            </a:r>
-            <a:r>
-              <a:rPr lang="en-GB" dirty="0" smtClean="0"/>
-              <a:t>on Disk</a:t>
-            </a:r>
-          </a:p>
-          <a:p>
-            <a:r>
-              <a:rPr lang="en-GB" dirty="0" smtClean="0"/>
-              <a:t>~18 Million </a:t>
-            </a:r>
-            <a:r>
-              <a:rPr lang="en-GB" dirty="0" smtClean="0"/>
-              <a:t>Pixels</a:t>
+              <a:t>~18 Million Pixels</a:t>
             </a:r>
           </a:p>
           <a:p>
@@ -4510,14 +4494,20 @@
                     <a:p>
                       <a:pPr algn="ctr" fontAlgn="b"/>
                       <a:r>
-                        <a:rPr lang="en-GB" sz="1800" b="1" i="0" u="none" strike="noStrike">
-                          <a:solidFill>
-                            <a:srgbClr val="000000"/>
-                          </a:solidFill>
-                          <a:latin typeface="Calibri"/>
-                        </a:rPr>
-                        <a:t>Mean Speed</a:t>
-                      </a:r>
+                        <a:rPr lang="en-GB" sz="1800" b="1" i="0" u="none" strike="noStrike" dirty="0" smtClean="0">
+                          <a:solidFill>
+                            <a:srgbClr val="000000"/>
+                          </a:solidFill>
+                          <a:latin typeface="+mn-lt"/>
+                        </a:rPr>
+                        <a:t>Mean Time</a:t>
+                      </a:r>
+                      <a:endParaRPr lang="en-GB" sz="1800" b="1" i="0" u="none" strike="noStrike" dirty="0">
+                        <a:solidFill>
+                          <a:srgbClr val="000000"/>
+                        </a:solidFill>
+                        <a:latin typeface="+mn-lt"/>
+                      </a:endParaRPr>
                     </a:p>
                   </a:txBody>
                   <a:tcPr marL="9525" marR="9525" marT="9525" marB="0" anchor="b">
@@ -6163,14 +6153,20 @@
                     <a:p>
                       <a:pPr algn="ctr" fontAlgn="b"/>
                       <a:r>
-                        <a:rPr lang="en-GB" sz="1600" b="1" i="0" u="none" strike="noStrike">
-                          <a:solidFill>
-                            <a:srgbClr val="000000"/>
-                          </a:solidFill>
-                          <a:latin typeface="Calibri"/>
-                        </a:rPr>
-                        <a:t>Mean Speed</a:t>
-                      </a:r>
+                        <a:rPr lang="en-GB" sz="1600" b="1" i="0" u="none" strike="noStrike" dirty="0" smtClean="0">
+                          <a:solidFill>
+                            <a:srgbClr val="000000"/>
+                          </a:solidFill>
+                          <a:latin typeface="+mn-lt"/>
+                        </a:rPr>
+                        <a:t>Mean Time</a:t>
+                      </a:r>
+                      <a:endParaRPr lang="en-GB" sz="1600" b="1" i="0" u="none" strike="noStrike" dirty="0">
+                        <a:solidFill>
+                          <a:srgbClr val="000000"/>
+                        </a:solidFill>
+                        <a:latin typeface="+mn-lt"/>
+                      </a:endParaRPr>
                     </a:p>
                   </a:txBody>
                   <a:tcPr marL="9525" marR="9525" marT="9525" marB="0" anchor="b">
@@ -6333,7 +6329,7 @@
                     <a:p>
                       <a:pPr algn="ctr" fontAlgn="b"/>
                       <a:r>
-                        <a:rPr lang="en-GB" sz="1600" b="1" i="0" u="none" strike="noStrike">
+                        <a:rPr lang="en-GB" sz="1600" b="1" i="0" u="none" strike="noStrike" dirty="0">
                           <a:solidFill>
                             <a:srgbClr val="000000"/>
                           </a:solidFill>
@@ -6608,29 +6604,13 @@
           <a:p>
             <a:r>
               <a:rPr lang="en-GB" dirty="0" smtClean="0"/>
-              <a:t>~</a:t>
-            </a:r>
+              <a:t>~700 MB on Disk</a:t>
+            </a:r>
+          </a:p>
+          <a:p>
             <a:r>
               <a:rPr lang="en-GB" dirty="0" smtClean="0"/>
-              <a:t>700 </a:t>
-            </a:r>
-            <a:r>
-              <a:rPr lang="en-GB" dirty="0" smtClean="0"/>
-              <a:t>MB </a:t>
-            </a:r>
-            <a:r>
-              <a:rPr lang="en-GB" dirty="0" smtClean="0"/>
-              <a:t>on Disk</a:t>
-            </a:r>
-          </a:p>
-          <a:p>
-            <a:r>
-              <a:rPr lang="en-GB" dirty="0" smtClean="0"/>
-              <a:t>~18 Million </a:t>
-            </a:r>
-            <a:r>
-              <a:rPr lang="en-GB" dirty="0" smtClean="0"/>
-              <a:t>Pixels</a:t>
+              <a:t>~18 Million Pixels</a:t>
             </a:r>
           </a:p>
           <a:p>
@@ -7951,14 +7931,29 @@
                     <a:p>
                       <a:pPr algn="ctr" fontAlgn="b"/>
                       <a:r>
-                        <a:rPr lang="en-GB" sz="1600" b="1" i="0" u="none" strike="noStrike">
-                          <a:solidFill>
-                            <a:srgbClr val="000000"/>
-                          </a:solidFill>
-                          <a:latin typeface="Calibri"/>
-                        </a:rPr>
-                        <a:t>Mean Speed</a:t>
-                      </a:r>
+                        <a:rPr lang="en-GB" sz="1600" b="1" i="0" u="none" strike="noStrike" dirty="0">
+                          <a:solidFill>
+                            <a:srgbClr val="000000"/>
+                          </a:solidFill>
+                          <a:latin typeface="Calibri"/>
+                        </a:rPr>
+                        <a:t>Mean </a:t>
+                      </a:r>
+                      <a:r>
+                        <a:rPr lang="en-GB" sz="1600" b="1" i="0" u="none" strike="noStrike" dirty="0" smtClean="0">
+                          <a:solidFill>
+                            <a:srgbClr val="000000"/>
+                          </a:solidFill>
+                          <a:latin typeface="Calibri"/>
+                        </a:rPr>
+                        <a:t>Time</a:t>
+                      </a:r>
+                      <a:endParaRPr lang="en-GB" sz="1600" b="1" i="0" u="none" strike="noStrike" dirty="0">
+                        <a:solidFill>
+                          <a:srgbClr val="000000"/>
+                        </a:solidFill>
+                        <a:latin typeface="Calibri"/>
+                      </a:endParaRPr>
                     </a:p>
                   </a:txBody>
                   <a:tcPr marL="9525" marR="9525" marT="9525" marB="0" anchor="b">
@@ -8414,7 +8409,7 @@
                     <a:p>
                       <a:pPr algn="ctr" fontAlgn="b"/>
                       <a:r>
-                        <a:rPr lang="en-GB" sz="1600" b="0" i="0" u="none" strike="noStrike">
+                        <a:rPr lang="en-GB" sz="1600" b="0" i="0" u="none" strike="noStrike" dirty="0">
                           <a:solidFill>
                             <a:srgbClr val="000000"/>
                           </a:solidFill>
@@ -9604,14 +9599,20 @@
                     <a:p>
                       <a:pPr algn="ctr" fontAlgn="b"/>
                       <a:r>
-                        <a:rPr lang="en-GB" sz="1600" b="1" i="0" u="none" strike="noStrike">
-                          <a:solidFill>
-                            <a:srgbClr val="000000"/>
-                          </a:solidFill>
-                          <a:latin typeface="Calibri"/>
-                        </a:rPr>
-                        <a:t>Mean Speed</a:t>
-                      </a:r>
+                        <a:rPr lang="en-GB" sz="1600" b="1" i="0" u="none" strike="noStrike" dirty="0" smtClean="0">
+                          <a:solidFill>
+                            <a:srgbClr val="000000"/>
+                          </a:solidFill>
+                          <a:latin typeface="+mn-lt"/>
+                        </a:rPr>
+                        <a:t>Mean Time</a:t>
+                      </a:r>
+                      <a:endParaRPr lang="en-GB" sz="1600" b="1" i="0" u="none" strike="noStrike" dirty="0">
+                        <a:solidFill>
+                          <a:srgbClr val="000000"/>
+                        </a:solidFill>
+                        <a:latin typeface="+mn-lt"/>
+                      </a:endParaRPr>
                     </a:p>
                   </a:txBody>
                   <a:tcPr marL="9525" marR="9525" marT="9525" marB="0" anchor="b">
@@ -9830,7 +9831,7 @@
                     <a:p>
                       <a:pPr algn="ctr" fontAlgn="b"/>
                       <a:r>
-                        <a:rPr lang="en-GB" sz="1600" b="1" i="0" u="none" strike="noStrike">
+                        <a:rPr lang="en-GB" sz="1600" b="1" i="0" u="none" strike="noStrike" dirty="0">
                           <a:solidFill>
                             <a:srgbClr val="000000"/>
                           </a:solidFill>
@@ -10063,11 +10064,7 @@
           <a:p>
             <a:r>
               <a:rPr lang="en-GB" dirty="0" smtClean="0"/>
-              <a:t>~682 KB </a:t>
-            </a:r>
-            <a:r>
-              <a:rPr lang="en-GB" dirty="0" smtClean="0"/>
-              <a:t>on Disk</a:t>
+              <a:t>~682 KB on Disk</a:t>
             </a:r>
           </a:p>
           <a:p>
@@ -10153,7 +10150,7 @@
                     <a:p>
                       <a:pPr algn="ctr" fontAlgn="b"/>
                       <a:r>
-                        <a:rPr lang="en-GB" sz="1600" b="0" i="0" u="none" strike="noStrike">
+                        <a:rPr lang="en-GB" sz="1600" b="0" i="0" u="none" strike="noStrike" dirty="0">
                           <a:solidFill>
                             <a:srgbClr val="000000"/>
                           </a:solidFill>
@@ -11343,14 +11340,20 @@
                     <a:p>
                       <a:pPr algn="ctr" fontAlgn="b"/>
                       <a:r>
-                        <a:rPr lang="en-GB" sz="1600" b="1" i="0" u="none" strike="noStrike">
-                          <a:solidFill>
-                            <a:srgbClr val="000000"/>
-                          </a:solidFill>
-                          <a:latin typeface="Calibri"/>
-                        </a:rPr>
-                        <a:t>Mean Speed</a:t>
-                      </a:r>
+                        <a:rPr lang="en-GB" sz="1600" b="1" i="0" u="none" strike="noStrike" dirty="0" smtClean="0">
+                          <a:solidFill>
+                            <a:srgbClr val="000000"/>
+                          </a:solidFill>
+                          <a:latin typeface="+mn-lt"/>
+                        </a:rPr>
+                        <a:t>Mean Time</a:t>
+                      </a:r>
+                      <a:endParaRPr lang="en-GB" sz="1600" b="1" i="0" u="none" strike="noStrike" dirty="0">
+                        <a:solidFill>
+                          <a:srgbClr val="000000"/>
+                        </a:solidFill>
+                        <a:latin typeface="+mn-lt"/>
+                      </a:endParaRPr>
                     </a:p>
                   </a:txBody>
                   <a:tcPr marL="9525" marR="9525" marT="9525" marB="0" anchor="b">
@@ -11569,7 +11572,7 @@
                     <a:p>
                       <a:pPr algn="ctr" fontAlgn="b"/>
                       <a:r>
-                        <a:rPr lang="en-GB" sz="1600" b="1" i="0" u="none" strike="noStrike">
+                        <a:rPr lang="en-GB" sz="1600" b="1" i="0" u="none" strike="noStrike" dirty="0">
                           <a:solidFill>
                             <a:srgbClr val="000000"/>
                           </a:solidFill>

</xml_diff>